<commit_message>
Modification de cahier de charges
</commit_message>
<xml_diff>
--- a/DOCUMENTS/Exposé_INF3196_Groupe-10-FindInvest.pptx
+++ b/DOCUMENTS/Exposé_INF3196_Groupe-10-FindInvest.pptx
@@ -957,7 +957,7 @@
   <p:cSld>
     <p:spTree>
       <p:nvGrpSpPr>
-        <p:cNvPr id="330" name="Shape 330"/>
+        <p:cNvPr id="331" name="Shape 331"/>
         <p:cNvGrpSpPr/>
         <p:nvPr/>
       </p:nvGrpSpPr>
@@ -971,7 +971,7 @@
       </p:grpSpPr>
       <p:sp>
         <p:nvSpPr>
-          <p:cNvPr id="331" name="Google Shape;331;g12f54a29fcd_0_708:notes"/>
+          <p:cNvPr id="332" name="Google Shape;332;g12f54a29fcd_0_708:notes"/>
           <p:cNvSpPr/>
           <p:nvPr>
             <p:ph idx="2" type="sldImg"/>
@@ -1016,7 +1016,7 @@
       </p:sp>
       <p:sp>
         <p:nvSpPr>
-          <p:cNvPr id="332" name="Google Shape;332;g12f54a29fcd_0_708:notes"/>
+          <p:cNvPr id="333" name="Google Shape;333;g12f54a29fcd_0_708:notes"/>
           <p:cNvSpPr txBox="1"/>
           <p:nvPr>
             <p:ph idx="1" type="body"/>
@@ -1074,7 +1074,7 @@
   <p:cSld>
     <p:spTree>
       <p:nvGrpSpPr>
-        <p:cNvPr id="338" name="Shape 338"/>
+        <p:cNvPr id="339" name="Shape 339"/>
         <p:cNvGrpSpPr/>
         <p:nvPr/>
       </p:nvGrpSpPr>
@@ -1088,7 +1088,7 @@
       </p:grpSpPr>
       <p:sp>
         <p:nvSpPr>
-          <p:cNvPr id="339" name="Google Shape;339;g12f54a29fcd_0_727:notes"/>
+          <p:cNvPr id="340" name="Google Shape;340;g12f54a29fcd_0_727:notes"/>
           <p:cNvSpPr/>
           <p:nvPr>
             <p:ph idx="2" type="sldImg"/>
@@ -1133,7 +1133,7 @@
       </p:sp>
       <p:sp>
         <p:nvSpPr>
-          <p:cNvPr id="340" name="Google Shape;340;g12f54a29fcd_0_727:notes"/>
+          <p:cNvPr id="341" name="Google Shape;341;g12f54a29fcd_0_727:notes"/>
           <p:cNvSpPr txBox="1"/>
           <p:nvPr>
             <p:ph idx="1" type="body"/>
@@ -1191,7 +1191,7 @@
   <p:cSld>
     <p:spTree>
       <p:nvGrpSpPr>
-        <p:cNvPr id="346" name="Shape 346"/>
+        <p:cNvPr id="347" name="Shape 347"/>
         <p:cNvGrpSpPr/>
         <p:nvPr/>
       </p:nvGrpSpPr>
@@ -1205,7 +1205,7 @@
       </p:grpSpPr>
       <p:sp>
         <p:nvSpPr>
-          <p:cNvPr id="347" name="Google Shape;347;g12f54a29fcd_0_734:notes"/>
+          <p:cNvPr id="348" name="Google Shape;348;g12f54a29fcd_0_734:notes"/>
           <p:cNvSpPr/>
           <p:nvPr>
             <p:ph idx="2" type="sldImg"/>
@@ -1250,7 +1250,7 @@
       </p:sp>
       <p:sp>
         <p:nvSpPr>
-          <p:cNvPr id="348" name="Google Shape;348;g12f54a29fcd_0_734:notes"/>
+          <p:cNvPr id="349" name="Google Shape;349;g12f54a29fcd_0_734:notes"/>
           <p:cNvSpPr txBox="1"/>
           <p:nvPr>
             <p:ph idx="1" type="body"/>
@@ -1308,7 +1308,7 @@
   <p:cSld>
     <p:spTree>
       <p:nvGrpSpPr>
-        <p:cNvPr id="353" name="Shape 353"/>
+        <p:cNvPr id="354" name="Shape 354"/>
         <p:cNvGrpSpPr/>
         <p:nvPr/>
       </p:nvGrpSpPr>
@@ -1322,7 +1322,7 @@
       </p:grpSpPr>
       <p:sp>
         <p:nvSpPr>
-          <p:cNvPr id="354" name="Google Shape;354;g12f54a29fcd_0_740:notes"/>
+          <p:cNvPr id="355" name="Google Shape;355;g12f54a29fcd_0_740:notes"/>
           <p:cNvSpPr/>
           <p:nvPr>
             <p:ph idx="2" type="sldImg"/>
@@ -1367,7 +1367,7 @@
       </p:sp>
       <p:sp>
         <p:nvSpPr>
-          <p:cNvPr id="355" name="Google Shape;355;g12f54a29fcd_0_740:notes"/>
+          <p:cNvPr id="356" name="Google Shape;356;g12f54a29fcd_0_740:notes"/>
           <p:cNvSpPr txBox="1"/>
           <p:nvPr>
             <p:ph idx="1" type="body"/>
@@ -1425,7 +1425,7 @@
   <p:cSld>
     <p:spTree>
       <p:nvGrpSpPr>
-        <p:cNvPr id="360" name="Shape 360"/>
+        <p:cNvPr id="361" name="Shape 361"/>
         <p:cNvGrpSpPr/>
         <p:nvPr/>
       </p:nvGrpSpPr>
@@ -1439,7 +1439,7 @@
       </p:grpSpPr>
       <p:sp>
         <p:nvSpPr>
-          <p:cNvPr id="361" name="Google Shape;361;g12f54a29fcd_0_746:notes"/>
+          <p:cNvPr id="362" name="Google Shape;362;g12f54a29fcd_0_746:notes"/>
           <p:cNvSpPr/>
           <p:nvPr>
             <p:ph idx="2" type="sldImg"/>
@@ -1484,7 +1484,7 @@
       </p:sp>
       <p:sp>
         <p:nvSpPr>
-          <p:cNvPr id="362" name="Google Shape;362;g12f54a29fcd_0_746:notes"/>
+          <p:cNvPr id="363" name="Google Shape;363;g12f54a29fcd_0_746:notes"/>
           <p:cNvSpPr txBox="1"/>
           <p:nvPr>
             <p:ph idx="1" type="body"/>
@@ -1542,7 +1542,7 @@
   <p:cSld>
     <p:spTree>
       <p:nvGrpSpPr>
-        <p:cNvPr id="367" name="Shape 367"/>
+        <p:cNvPr id="368" name="Shape 368"/>
         <p:cNvGrpSpPr/>
         <p:nvPr/>
       </p:nvGrpSpPr>
@@ -1556,7 +1556,7 @@
       </p:grpSpPr>
       <p:sp>
         <p:nvSpPr>
-          <p:cNvPr id="368" name="Google Shape;368;g12f54a29fcd_0_752:notes"/>
+          <p:cNvPr id="369" name="Google Shape;369;g12f54a29fcd_0_752:notes"/>
           <p:cNvSpPr/>
           <p:nvPr>
             <p:ph idx="2" type="sldImg"/>
@@ -1601,7 +1601,7 @@
       </p:sp>
       <p:sp>
         <p:nvSpPr>
-          <p:cNvPr id="369" name="Google Shape;369;g12f54a29fcd_0_752:notes"/>
+          <p:cNvPr id="370" name="Google Shape;370;g12f54a29fcd_0_752:notes"/>
           <p:cNvSpPr txBox="1"/>
           <p:nvPr>
             <p:ph idx="1" type="body"/>
@@ -1659,7 +1659,7 @@
   <p:cSld>
     <p:spTree>
       <p:nvGrpSpPr>
-        <p:cNvPr id="374" name="Shape 374"/>
+        <p:cNvPr id="375" name="Shape 375"/>
         <p:cNvGrpSpPr/>
         <p:nvPr/>
       </p:nvGrpSpPr>
@@ -1673,7 +1673,7 @@
       </p:grpSpPr>
       <p:sp>
         <p:nvSpPr>
-          <p:cNvPr id="375" name="Google Shape;375;g12f54a29fcd_0_758:notes"/>
+          <p:cNvPr id="376" name="Google Shape;376;g12f54a29fcd_0_758:notes"/>
           <p:cNvSpPr/>
           <p:nvPr>
             <p:ph idx="2" type="sldImg"/>
@@ -1718,7 +1718,7 @@
       </p:sp>
       <p:sp>
         <p:nvSpPr>
-          <p:cNvPr id="376" name="Google Shape;376;g12f54a29fcd_0_758:notes"/>
+          <p:cNvPr id="377" name="Google Shape;377;g12f54a29fcd_0_758:notes"/>
           <p:cNvSpPr txBox="1"/>
           <p:nvPr>
             <p:ph idx="1" type="body"/>
@@ -1776,7 +1776,7 @@
   <p:cSld>
     <p:spTree>
       <p:nvGrpSpPr>
-        <p:cNvPr id="381" name="Shape 381"/>
+        <p:cNvPr id="382" name="Shape 382"/>
         <p:cNvGrpSpPr/>
         <p:nvPr/>
       </p:nvGrpSpPr>
@@ -1790,7 +1790,7 @@
       </p:grpSpPr>
       <p:sp>
         <p:nvSpPr>
-          <p:cNvPr id="382" name="Google Shape;382;g12f54a29fcd_0_764:notes"/>
+          <p:cNvPr id="383" name="Google Shape;383;g12f54a29fcd_0_764:notes"/>
           <p:cNvSpPr/>
           <p:nvPr>
             <p:ph idx="2" type="sldImg"/>
@@ -1835,7 +1835,7 @@
       </p:sp>
       <p:sp>
         <p:nvSpPr>
-          <p:cNvPr id="383" name="Google Shape;383;g12f54a29fcd_0_764:notes"/>
+          <p:cNvPr id="384" name="Google Shape;384;g12f54a29fcd_0_764:notes"/>
           <p:cNvSpPr txBox="1"/>
           <p:nvPr>
             <p:ph idx="1" type="body"/>
@@ -1893,7 +1893,7 @@
   <p:cSld>
     <p:spTree>
       <p:nvGrpSpPr>
-        <p:cNvPr id="390" name="Shape 390"/>
+        <p:cNvPr id="391" name="Shape 391"/>
         <p:cNvGrpSpPr/>
         <p:nvPr/>
       </p:nvGrpSpPr>
@@ -1907,7 +1907,7 @@
       </p:grpSpPr>
       <p:sp>
         <p:nvSpPr>
-          <p:cNvPr id="391" name="Google Shape;391;g12f54a29fcd_0_919:notes"/>
+          <p:cNvPr id="392" name="Google Shape;392;g12f54a29fcd_0_919:notes"/>
           <p:cNvSpPr/>
           <p:nvPr>
             <p:ph idx="2" type="sldImg"/>
@@ -1952,7 +1952,7 @@
       </p:sp>
       <p:sp>
         <p:nvSpPr>
-          <p:cNvPr id="392" name="Google Shape;392;g12f54a29fcd_0_919:notes"/>
+          <p:cNvPr id="393" name="Google Shape;393;g12f54a29fcd_0_919:notes"/>
           <p:cNvSpPr txBox="1"/>
           <p:nvPr>
             <p:ph idx="1" type="body"/>
@@ -2127,7 +2127,7 @@
   <p:cSld>
     <p:spTree>
       <p:nvGrpSpPr>
-        <p:cNvPr id="399" name="Shape 399"/>
+        <p:cNvPr id="400" name="Shape 400"/>
         <p:cNvGrpSpPr/>
         <p:nvPr/>
       </p:nvGrpSpPr>
@@ -2141,7 +2141,7 @@
       </p:grpSpPr>
       <p:sp>
         <p:nvSpPr>
-          <p:cNvPr id="400" name="Google Shape;400;g12f54a29fcd_0_781:notes"/>
+          <p:cNvPr id="401" name="Google Shape;401;g12f54a29fcd_0_781:notes"/>
           <p:cNvSpPr/>
           <p:nvPr>
             <p:ph idx="2" type="sldImg"/>
@@ -2186,7 +2186,7 @@
       </p:sp>
       <p:sp>
         <p:nvSpPr>
-          <p:cNvPr id="401" name="Google Shape;401;g12f54a29fcd_0_781:notes"/>
+          <p:cNvPr id="402" name="Google Shape;402;g12f54a29fcd_0_781:notes"/>
           <p:cNvSpPr txBox="1"/>
           <p:nvPr>
             <p:ph idx="1" type="body"/>
@@ -2244,7 +2244,7 @@
   <p:cSld>
     <p:spTree>
       <p:nvGrpSpPr>
-        <p:cNvPr id="405" name="Shape 405"/>
+        <p:cNvPr id="406" name="Shape 406"/>
         <p:cNvGrpSpPr/>
         <p:nvPr/>
       </p:nvGrpSpPr>
@@ -2258,7 +2258,7 @@
       </p:grpSpPr>
       <p:sp>
         <p:nvSpPr>
-          <p:cNvPr id="406" name="Google Shape;406;g12f54a29fcd_0_927:notes"/>
+          <p:cNvPr id="407" name="Google Shape;407;g12f54a29fcd_0_927:notes"/>
           <p:cNvSpPr/>
           <p:nvPr>
             <p:ph idx="2" type="sldImg"/>
@@ -2303,7 +2303,7 @@
       </p:sp>
       <p:sp>
         <p:nvSpPr>
-          <p:cNvPr id="407" name="Google Shape;407;g12f54a29fcd_0_927:notes"/>
+          <p:cNvPr id="408" name="Google Shape;408;g12f54a29fcd_0_927:notes"/>
           <p:cNvSpPr txBox="1"/>
           <p:nvPr>
             <p:ph idx="1" type="body"/>
@@ -2361,7 +2361,7 @@
   <p:cSld>
     <p:spTree>
       <p:nvGrpSpPr>
-        <p:cNvPr id="412" name="Shape 412"/>
+        <p:cNvPr id="413" name="Shape 413"/>
         <p:cNvGrpSpPr/>
         <p:nvPr/>
       </p:nvGrpSpPr>
@@ -2375,7 +2375,7 @@
       </p:grpSpPr>
       <p:sp>
         <p:nvSpPr>
-          <p:cNvPr id="413" name="Google Shape;413;g12f54a29fcd_0_933:notes"/>
+          <p:cNvPr id="414" name="Google Shape;414;g12f54a29fcd_0_933:notes"/>
           <p:cNvSpPr/>
           <p:nvPr>
             <p:ph idx="2" type="sldImg"/>
@@ -2420,7 +2420,7 @@
       </p:sp>
       <p:sp>
         <p:nvSpPr>
-          <p:cNvPr id="414" name="Google Shape;414;g12f54a29fcd_0_933:notes"/>
+          <p:cNvPr id="415" name="Google Shape;415;g12f54a29fcd_0_933:notes"/>
           <p:cNvSpPr txBox="1"/>
           <p:nvPr>
             <p:ph idx="1" type="body"/>
@@ -2478,7 +2478,7 @@
   <p:cSld>
     <p:spTree>
       <p:nvGrpSpPr>
-        <p:cNvPr id="419" name="Shape 419"/>
+        <p:cNvPr id="420" name="Shape 420"/>
         <p:cNvGrpSpPr/>
         <p:nvPr/>
       </p:nvGrpSpPr>
@@ -2492,7 +2492,7 @@
       </p:grpSpPr>
       <p:sp>
         <p:nvSpPr>
-          <p:cNvPr id="420" name="Google Shape;420;g12f54a29fcd_0_786:notes"/>
+          <p:cNvPr id="421" name="Google Shape;421;g12f54a29fcd_0_786:notes"/>
           <p:cNvSpPr/>
           <p:nvPr>
             <p:ph idx="2" type="sldImg"/>
@@ -2537,7 +2537,7 @@
       </p:sp>
       <p:sp>
         <p:nvSpPr>
-          <p:cNvPr id="421" name="Google Shape;421;g12f54a29fcd_0_786:notes"/>
+          <p:cNvPr id="422" name="Google Shape;422;g12f54a29fcd_0_786:notes"/>
           <p:cNvSpPr txBox="1"/>
           <p:nvPr>
             <p:ph idx="1" type="body"/>
@@ -23684,11 +23684,7 @@
             </a:pPr>
             <a:r>
               <a:rPr lang="fr"/>
-              <a:t>Architecture</a:t>
-            </a:r>
-            <a:r>
-              <a:rPr lang="fr"/>
-              <a:t> technique</a:t>
+              <a:t>Architecture technique</a:t>
             </a:r>
             <a:endParaRPr/>
           </a:p>
@@ -23721,6 +23717,58 @@
           </a:ln>
         </p:spPr>
       </p:pic>
+      <p:sp>
+        <p:nvSpPr>
+          <p:cNvPr id="330" name="Google Shape;330;p34"/>
+          <p:cNvSpPr txBox="1"/>
+          <p:nvPr/>
+        </p:nvSpPr>
+        <p:spPr>
+          <a:xfrm>
+            <a:off x="6017875" y="2475025"/>
+            <a:ext cx="1223400" cy="400200"/>
+          </a:xfrm>
+          <a:prstGeom prst="rect">
+            <a:avLst/>
+          </a:prstGeom>
+          <a:noFill/>
+          <a:ln>
+            <a:noFill/>
+          </a:ln>
+        </p:spPr>
+        <p:txBody>
+          <a:bodyPr anchorCtr="0" anchor="t" bIns="91425" lIns="91425" spcFirstLastPara="1" rIns="91425" wrap="square" tIns="91425">
+            <a:spAutoFit/>
+          </a:bodyPr>
+          <a:lstStyle/>
+          <a:p>
+            <a:pPr indent="0" lvl="0" marL="0" rtl="0" algn="l">
+              <a:spcBef>
+                <a:spcPts val="0"/>
+              </a:spcBef>
+              <a:spcAft>
+                <a:spcPts val="0"/>
+              </a:spcAft>
+              <a:buNone/>
+            </a:pPr>
+            <a:r>
+              <a:rPr lang="fr">
+                <a:latin typeface="Calibri"/>
+                <a:ea typeface="Calibri"/>
+                <a:cs typeface="Calibri"/>
+                <a:sym typeface="Calibri"/>
+              </a:rPr>
+              <a:t>Navigateur</a:t>
+            </a:r>
+            <a:endParaRPr>
+              <a:latin typeface="Calibri"/>
+              <a:ea typeface="Calibri"/>
+              <a:cs typeface="Calibri"/>
+              <a:sym typeface="Calibri"/>
+            </a:endParaRPr>
+          </a:p>
+        </p:txBody>
+      </p:sp>
     </p:spTree>
   </p:cSld>
   <p:clrMapOvr>
@@ -23734,7 +23782,7 @@
   <p:cSld>
     <p:spTree>
       <p:nvGrpSpPr>
-        <p:cNvPr id="333" name="Shape 333"/>
+        <p:cNvPr id="334" name="Shape 334"/>
         <p:cNvGrpSpPr/>
         <p:nvPr/>
       </p:nvGrpSpPr>
@@ -23748,7 +23796,7 @@
       </p:grpSpPr>
       <p:sp>
         <p:nvSpPr>
-          <p:cNvPr id="334" name="Google Shape;334;p35"/>
+          <p:cNvPr id="335" name="Google Shape;335;p35"/>
           <p:cNvSpPr txBox="1"/>
           <p:nvPr>
             <p:ph type="title"/>
@@ -23788,11 +23836,11 @@
             </a:pPr>
             <a:r>
               <a:rPr lang="fr"/>
-              <a:t>Architecture</a:t>
+              <a:t>ArchitectureDiagramme f</a:t>
             </a:r>
             <a:r>
               <a:rPr lang="fr"/>
-              <a:t> fonctionnelle</a:t>
+              <a:t>onctionnelle</a:t>
             </a:r>
             <a:endParaRPr/>
           </a:p>
@@ -23800,7 +23848,7 @@
       </p:sp>
       <p:pic>
         <p:nvPicPr>
-          <p:cNvPr id="335" name="Google Shape;335;p35"/>
+          <p:cNvPr id="336" name="Google Shape;336;p35"/>
           <p:cNvPicPr preferRelativeResize="0"/>
           <p:nvPr/>
         </p:nvPicPr>
@@ -23827,7 +23875,7 @@
       </p:pic>
       <p:pic>
         <p:nvPicPr>
-          <p:cNvPr id="336" name="Google Shape;336;p35"/>
+          <p:cNvPr id="337" name="Google Shape;337;p35"/>
           <p:cNvPicPr preferRelativeResize="0"/>
           <p:nvPr/>
         </p:nvPicPr>
@@ -23854,7 +23902,7 @@
       </p:pic>
       <p:pic>
         <p:nvPicPr>
-          <p:cNvPr id="337" name="Google Shape;337;p35"/>
+          <p:cNvPr id="338" name="Google Shape;338;p35"/>
           <p:cNvPicPr preferRelativeResize="0"/>
           <p:nvPr/>
         </p:nvPicPr>
@@ -23892,7 +23940,7 @@
   <p:cSld>
     <p:spTree>
       <p:nvGrpSpPr>
-        <p:cNvPr id="341" name="Shape 341"/>
+        <p:cNvPr id="342" name="Shape 342"/>
         <p:cNvGrpSpPr/>
         <p:nvPr/>
       </p:nvGrpSpPr>
@@ -23906,7 +23954,7 @@
       </p:grpSpPr>
       <p:sp>
         <p:nvSpPr>
-          <p:cNvPr id="342" name="Google Shape;342;p36"/>
+          <p:cNvPr id="343" name="Google Shape;343;p36"/>
           <p:cNvSpPr txBox="1"/>
           <p:nvPr>
             <p:ph type="title"/>
@@ -23954,7 +24002,7 @@
       </p:sp>
       <p:sp>
         <p:nvSpPr>
-          <p:cNvPr id="343" name="Google Shape;343;p36"/>
+          <p:cNvPr id="344" name="Google Shape;344;p36"/>
           <p:cNvSpPr txBox="1"/>
           <p:nvPr>
             <p:ph idx="1" type="body"/>
@@ -24012,7 +24060,7 @@
       </p:sp>
       <p:pic>
         <p:nvPicPr>
-          <p:cNvPr id="344" name="Google Shape;344;p36"/>
+          <p:cNvPr id="345" name="Google Shape;345;p36"/>
           <p:cNvPicPr preferRelativeResize="0"/>
           <p:nvPr/>
         </p:nvPicPr>
@@ -24039,7 +24087,7 @@
       </p:pic>
       <p:pic>
         <p:nvPicPr>
-          <p:cNvPr id="345" name="Google Shape;345;p36"/>
+          <p:cNvPr id="346" name="Google Shape;346;p36"/>
           <p:cNvPicPr preferRelativeResize="0"/>
           <p:nvPr/>
         </p:nvPicPr>
@@ -24077,7 +24125,7 @@
   <p:cSld>
     <p:spTree>
       <p:nvGrpSpPr>
-        <p:cNvPr id="349" name="Shape 349"/>
+        <p:cNvPr id="350" name="Shape 350"/>
         <p:cNvGrpSpPr/>
         <p:nvPr/>
       </p:nvGrpSpPr>
@@ -24091,7 +24139,7 @@
       </p:grpSpPr>
       <p:sp>
         <p:nvSpPr>
-          <p:cNvPr id="350" name="Google Shape;350;p37"/>
+          <p:cNvPr id="351" name="Google Shape;351;p37"/>
           <p:cNvSpPr txBox="1"/>
           <p:nvPr>
             <p:ph type="title"/>
@@ -24139,7 +24187,7 @@
       </p:sp>
       <p:sp>
         <p:nvSpPr>
-          <p:cNvPr id="351" name="Google Shape;351;p37"/>
+          <p:cNvPr id="352" name="Google Shape;352;p37"/>
           <p:cNvSpPr txBox="1"/>
           <p:nvPr>
             <p:ph idx="1" type="body"/>
@@ -24369,7 +24417,7 @@
       </p:sp>
       <p:pic>
         <p:nvPicPr>
-          <p:cNvPr id="352" name="Google Shape;352;p37"/>
+          <p:cNvPr id="353" name="Google Shape;353;p37"/>
           <p:cNvPicPr preferRelativeResize="0"/>
           <p:nvPr/>
         </p:nvPicPr>
@@ -24407,7 +24455,7 @@
   <p:cSld>
     <p:spTree>
       <p:nvGrpSpPr>
-        <p:cNvPr id="356" name="Shape 356"/>
+        <p:cNvPr id="357" name="Shape 357"/>
         <p:cNvGrpSpPr/>
         <p:nvPr/>
       </p:nvGrpSpPr>
@@ -24421,7 +24469,7 @@
       </p:grpSpPr>
       <p:sp>
         <p:nvSpPr>
-          <p:cNvPr id="357" name="Google Shape;357;p38"/>
+          <p:cNvPr id="358" name="Google Shape;358;p38"/>
           <p:cNvSpPr txBox="1"/>
           <p:nvPr>
             <p:ph type="title"/>
@@ -24469,7 +24517,7 @@
       </p:sp>
       <p:sp>
         <p:nvSpPr>
-          <p:cNvPr id="358" name="Google Shape;358;p38"/>
+          <p:cNvPr id="359" name="Google Shape;359;p38"/>
           <p:cNvSpPr txBox="1"/>
           <p:nvPr>
             <p:ph idx="1" type="body"/>
@@ -24558,7 +24606,7 @@
       </p:sp>
       <p:pic>
         <p:nvPicPr>
-          <p:cNvPr id="359" name="Google Shape;359;p38"/>
+          <p:cNvPr id="360" name="Google Shape;360;p38"/>
           <p:cNvPicPr preferRelativeResize="0"/>
           <p:nvPr/>
         </p:nvPicPr>
@@ -24596,7 +24644,7 @@
   <p:cSld>
     <p:spTree>
       <p:nvGrpSpPr>
-        <p:cNvPr id="363" name="Shape 363"/>
+        <p:cNvPr id="364" name="Shape 364"/>
         <p:cNvGrpSpPr/>
         <p:nvPr/>
       </p:nvGrpSpPr>
@@ -24610,7 +24658,7 @@
       </p:grpSpPr>
       <p:sp>
         <p:nvSpPr>
-          <p:cNvPr id="364" name="Google Shape;364;p39"/>
+          <p:cNvPr id="365" name="Google Shape;365;p39"/>
           <p:cNvSpPr txBox="1"/>
           <p:nvPr>
             <p:ph type="title"/>
@@ -24658,7 +24706,7 @@
       </p:sp>
       <p:sp>
         <p:nvSpPr>
-          <p:cNvPr id="365" name="Google Shape;365;p39"/>
+          <p:cNvPr id="366" name="Google Shape;366;p39"/>
           <p:cNvSpPr txBox="1"/>
           <p:nvPr>
             <p:ph idx="1" type="body"/>
@@ -24747,7 +24795,7 @@
       </p:sp>
       <p:pic>
         <p:nvPicPr>
-          <p:cNvPr id="366" name="Google Shape;366;p39"/>
+          <p:cNvPr id="367" name="Google Shape;367;p39"/>
           <p:cNvPicPr preferRelativeResize="0"/>
           <p:nvPr/>
         </p:nvPicPr>
@@ -24785,7 +24833,7 @@
   <p:cSld>
     <p:spTree>
       <p:nvGrpSpPr>
-        <p:cNvPr id="370" name="Shape 370"/>
+        <p:cNvPr id="371" name="Shape 371"/>
         <p:cNvGrpSpPr/>
         <p:nvPr/>
       </p:nvGrpSpPr>
@@ -24799,7 +24847,7 @@
       </p:grpSpPr>
       <p:sp>
         <p:nvSpPr>
-          <p:cNvPr id="371" name="Google Shape;371;p40"/>
+          <p:cNvPr id="372" name="Google Shape;372;p40"/>
           <p:cNvSpPr txBox="1"/>
           <p:nvPr>
             <p:ph type="title"/>
@@ -24867,7 +24915,7 @@
       </p:sp>
       <p:sp>
         <p:nvSpPr>
-          <p:cNvPr id="372" name="Google Shape;372;p40"/>
+          <p:cNvPr id="373" name="Google Shape;373;p40"/>
           <p:cNvSpPr txBox="1"/>
           <p:nvPr>
             <p:ph idx="1" type="body"/>
@@ -25066,7 +25114,7 @@
       </p:sp>
       <p:pic>
         <p:nvPicPr>
-          <p:cNvPr id="373" name="Google Shape;373;p40"/>
+          <p:cNvPr id="374" name="Google Shape;374;p40"/>
           <p:cNvPicPr preferRelativeResize="0"/>
           <p:nvPr/>
         </p:nvPicPr>
@@ -25104,7 +25152,7 @@
   <p:cSld>
     <p:spTree>
       <p:nvGrpSpPr>
-        <p:cNvPr id="377" name="Shape 377"/>
+        <p:cNvPr id="378" name="Shape 378"/>
         <p:cNvGrpSpPr/>
         <p:nvPr/>
       </p:nvGrpSpPr>
@@ -25118,7 +25166,7 @@
       </p:grpSpPr>
       <p:sp>
         <p:nvSpPr>
-          <p:cNvPr id="378" name="Google Shape;378;p41"/>
+          <p:cNvPr id="379" name="Google Shape;379;p41"/>
           <p:cNvSpPr txBox="1"/>
           <p:nvPr>
             <p:ph type="title"/>
@@ -25186,7 +25234,7 @@
       </p:sp>
       <p:sp>
         <p:nvSpPr>
-          <p:cNvPr id="379" name="Google Shape;379;p41"/>
+          <p:cNvPr id="380" name="Google Shape;380;p41"/>
           <p:cNvSpPr txBox="1"/>
           <p:nvPr>
             <p:ph idx="1" type="body"/>
@@ -25340,7 +25388,7 @@
       </p:sp>
       <p:pic>
         <p:nvPicPr>
-          <p:cNvPr id="380" name="Google Shape;380;p41"/>
+          <p:cNvPr id="381" name="Google Shape;381;p41"/>
           <p:cNvPicPr preferRelativeResize="0"/>
           <p:nvPr/>
         </p:nvPicPr>
@@ -25378,7 +25426,7 @@
   <p:cSld>
     <p:spTree>
       <p:nvGrpSpPr>
-        <p:cNvPr id="384" name="Shape 384"/>
+        <p:cNvPr id="385" name="Shape 385"/>
         <p:cNvGrpSpPr/>
         <p:nvPr/>
       </p:nvGrpSpPr>
@@ -25392,7 +25440,7 @@
       </p:grpSpPr>
       <p:sp>
         <p:nvSpPr>
-          <p:cNvPr id="385" name="Google Shape;385;p42"/>
+          <p:cNvPr id="386" name="Google Shape;386;p42"/>
           <p:cNvSpPr txBox="1"/>
           <p:nvPr>
             <p:ph type="title"/>
@@ -25440,7 +25488,7 @@
       </p:sp>
       <p:pic>
         <p:nvPicPr>
-          <p:cNvPr id="386" name="Google Shape;386;p42"/>
+          <p:cNvPr id="387" name="Google Shape;387;p42"/>
           <p:cNvPicPr preferRelativeResize="0"/>
           <p:nvPr/>
         </p:nvPicPr>
@@ -25467,7 +25515,7 @@
       </p:pic>
       <p:pic>
         <p:nvPicPr>
-          <p:cNvPr id="387" name="Google Shape;387;p42"/>
+          <p:cNvPr id="388" name="Google Shape;388;p42"/>
           <p:cNvPicPr preferRelativeResize="0"/>
           <p:nvPr/>
         </p:nvPicPr>
@@ -25494,7 +25542,7 @@
       </p:pic>
       <p:pic>
         <p:nvPicPr>
-          <p:cNvPr id="388" name="Google Shape;388;p42"/>
+          <p:cNvPr id="389" name="Google Shape;389;p42"/>
           <p:cNvPicPr preferRelativeResize="0"/>
           <p:nvPr/>
         </p:nvPicPr>
@@ -25521,7 +25569,7 @@
       </p:pic>
       <p:sp>
         <p:nvSpPr>
-          <p:cNvPr id="389" name="Google Shape;389;p42"/>
+          <p:cNvPr id="390" name="Google Shape;390;p42"/>
           <p:cNvSpPr txBox="1"/>
           <p:nvPr/>
         </p:nvSpPr>
@@ -25611,7 +25659,7 @@
   <p:cSld>
     <p:spTree>
       <p:nvGrpSpPr>
-        <p:cNvPr id="393" name="Shape 393"/>
+        <p:cNvPr id="394" name="Shape 394"/>
         <p:cNvGrpSpPr/>
         <p:nvPr/>
       </p:nvGrpSpPr>
@@ -25625,7 +25673,7 @@
       </p:grpSpPr>
       <p:sp>
         <p:nvSpPr>
-          <p:cNvPr id="394" name="Google Shape;394;p43"/>
+          <p:cNvPr id="395" name="Google Shape;395;p43"/>
           <p:cNvSpPr txBox="1"/>
           <p:nvPr>
             <p:ph type="title"/>
@@ -25673,7 +25721,7 @@
       </p:sp>
       <p:pic>
         <p:nvPicPr>
-          <p:cNvPr id="395" name="Google Shape;395;p43"/>
+          <p:cNvPr id="396" name="Google Shape;396;p43"/>
           <p:cNvPicPr preferRelativeResize="0"/>
           <p:nvPr/>
         </p:nvPicPr>
@@ -25700,7 +25748,7 @@
       </p:pic>
       <p:pic>
         <p:nvPicPr>
-          <p:cNvPr id="396" name="Google Shape;396;p43"/>
+          <p:cNvPr id="397" name="Google Shape;397;p43"/>
           <p:cNvPicPr preferRelativeResize="0"/>
           <p:nvPr/>
         </p:nvPicPr>
@@ -25727,7 +25775,7 @@
       </p:pic>
       <p:pic>
         <p:nvPicPr>
-          <p:cNvPr id="397" name="Google Shape;397;p43"/>
+          <p:cNvPr id="398" name="Google Shape;398;p43"/>
           <p:cNvPicPr preferRelativeResize="0"/>
           <p:nvPr/>
         </p:nvPicPr>
@@ -25754,7 +25802,7 @@
       </p:pic>
       <p:sp>
         <p:nvSpPr>
-          <p:cNvPr id="398" name="Google Shape;398;p43"/>
+          <p:cNvPr id="399" name="Google Shape;399;p43"/>
           <p:cNvSpPr txBox="1"/>
           <p:nvPr/>
         </p:nvSpPr>
@@ -26951,7 +26999,7 @@
   <p:cSld>
     <p:spTree>
       <p:nvGrpSpPr>
-        <p:cNvPr id="402" name="Shape 402"/>
+        <p:cNvPr id="403" name="Shape 403"/>
         <p:cNvGrpSpPr/>
         <p:nvPr/>
       </p:nvGrpSpPr>
@@ -26965,7 +27013,7 @@
       </p:grpSpPr>
       <p:sp>
         <p:nvSpPr>
-          <p:cNvPr id="403" name="Google Shape;403;p44"/>
+          <p:cNvPr id="404" name="Google Shape;404;p44"/>
           <p:cNvSpPr txBox="1"/>
           <p:nvPr>
             <p:ph type="title"/>
@@ -27013,7 +27061,7 @@
       </p:sp>
       <p:sp>
         <p:nvSpPr>
-          <p:cNvPr id="404" name="Google Shape;404;p44"/>
+          <p:cNvPr id="405" name="Google Shape;405;p44"/>
           <p:cNvSpPr txBox="1"/>
           <p:nvPr>
             <p:ph idx="1" type="body"/>
@@ -27082,7 +27130,7 @@
   <p:cSld>
     <p:spTree>
       <p:nvGrpSpPr>
-        <p:cNvPr id="408" name="Shape 408"/>
+        <p:cNvPr id="409" name="Shape 409"/>
         <p:cNvGrpSpPr/>
         <p:nvPr/>
       </p:nvGrpSpPr>
@@ -27096,7 +27144,7 @@
       </p:grpSpPr>
       <p:sp>
         <p:nvSpPr>
-          <p:cNvPr id="409" name="Google Shape;409;p45"/>
+          <p:cNvPr id="410" name="Google Shape;410;p45"/>
           <p:cNvSpPr txBox="1"/>
           <p:nvPr>
             <p:ph type="title"/>
@@ -27144,7 +27192,7 @@
       </p:sp>
       <p:sp>
         <p:nvSpPr>
-          <p:cNvPr id="410" name="Google Shape;410;p45"/>
+          <p:cNvPr id="411" name="Google Shape;411;p45"/>
           <p:cNvSpPr txBox="1"/>
           <p:nvPr>
             <p:ph idx="1" type="body"/>
@@ -27498,7 +27546,7 @@
       </p:sp>
       <p:pic>
         <p:nvPicPr>
-          <p:cNvPr id="411" name="Google Shape;411;p45"/>
+          <p:cNvPr id="412" name="Google Shape;412;p45"/>
           <p:cNvPicPr preferRelativeResize="0"/>
           <p:nvPr/>
         </p:nvPicPr>
@@ -27512,8 +27560,8 @@
         </p:blipFill>
         <p:spPr>
           <a:xfrm>
-            <a:off x="3396125" y="912875"/>
-            <a:ext cx="5442950" cy="4078225"/>
+            <a:off x="3379350" y="910175"/>
+            <a:ext cx="5612250" cy="4040500"/>
           </a:xfrm>
           <a:prstGeom prst="rect">
             <a:avLst/>
@@ -27537,7 +27585,7 @@
   <p:cSld>
     <p:spTree>
       <p:nvGrpSpPr>
-        <p:cNvPr id="415" name="Shape 415"/>
+        <p:cNvPr id="416" name="Shape 416"/>
         <p:cNvGrpSpPr/>
         <p:nvPr/>
       </p:nvGrpSpPr>
@@ -27551,7 +27599,7 @@
       </p:grpSpPr>
       <p:sp>
         <p:nvSpPr>
-          <p:cNvPr id="416" name="Google Shape;416;p46"/>
+          <p:cNvPr id="417" name="Google Shape;417;p46"/>
           <p:cNvSpPr txBox="1"/>
           <p:nvPr>
             <p:ph type="title"/>
@@ -27619,7 +27667,7 @@
       </p:sp>
       <p:sp>
         <p:nvSpPr>
-          <p:cNvPr id="417" name="Google Shape;417;p46"/>
+          <p:cNvPr id="418" name="Google Shape;418;p46"/>
           <p:cNvSpPr txBox="1"/>
           <p:nvPr>
             <p:ph idx="1" type="body"/>
@@ -27849,7 +27897,7 @@
       </p:sp>
       <p:pic>
         <p:nvPicPr>
-          <p:cNvPr id="418" name="Google Shape;418;p46"/>
+          <p:cNvPr id="419" name="Google Shape;419;p46"/>
           <p:cNvPicPr preferRelativeResize="0"/>
           <p:nvPr/>
         </p:nvPicPr>
@@ -27888,7 +27936,7 @@
   <p:cSld>
     <p:spTree>
       <p:nvGrpSpPr>
-        <p:cNvPr id="422" name="Shape 422"/>
+        <p:cNvPr id="423" name="Shape 423"/>
         <p:cNvGrpSpPr/>
         <p:nvPr/>
       </p:nvGrpSpPr>
@@ -27902,7 +27950,7 @@
       </p:grpSpPr>
       <p:sp>
         <p:nvSpPr>
-          <p:cNvPr id="423" name="Google Shape;423;p47"/>
+          <p:cNvPr id="424" name="Google Shape;424;p47"/>
           <p:cNvSpPr txBox="1"/>
           <p:nvPr>
             <p:ph type="title"/>
@@ -27950,7 +27998,7 @@
       </p:sp>
       <p:sp>
         <p:nvSpPr>
-          <p:cNvPr id="424" name="Google Shape;424;p47"/>
+          <p:cNvPr id="425" name="Google Shape;425;p47"/>
           <p:cNvSpPr txBox="1"/>
           <p:nvPr>
             <p:ph idx="1" type="body"/>
@@ -29283,7 +29331,7 @@
             <a:tbl>
               <a:tblPr>
                 <a:noFill/>
-                <a:tableStyleId>{6B89540C-2635-4364-8229-3BF729A575A5}</a:tableStyleId>
+                <a:tableStyleId>{3A00203B-D3CA-47C7-8B1C-232F97CC3B56}</a:tableStyleId>
               </a:tblPr>
               <a:tblGrid>
                 <a:gridCol w="2000250"/>
@@ -30662,7 +30710,7 @@
             <a:tbl>
               <a:tblPr>
                 <a:noFill/>
-                <a:tableStyleId>{131945B9-150A-4A57-A7DA-0963E243658F}</a:tableStyleId>
+                <a:tableStyleId>{84251FD5-59A0-4F93-A172-937DADDE97CD}</a:tableStyleId>
               </a:tblPr>
               <a:tblGrid>
                 <a:gridCol w="2219325"/>
@@ -31279,7 +31327,11 @@
             </a:pPr>
             <a:r>
               <a:rPr lang="fr"/>
-              <a:t>Architectures</a:t>
+              <a:t>Architecture</a:t>
+            </a:r>
+            <a:r>
+              <a:rPr lang="fr"/>
+              <a:t>s</a:t>
             </a:r>
             <a:endParaRPr/>
           </a:p>
@@ -31381,7 +31433,11 @@
             </a:pPr>
             <a:r>
               <a:rPr lang="fr" sz="1800"/>
-              <a:t>Fonctionnelle et Technique</a:t>
+              <a:t>Fonctionnelle et </a:t>
+            </a:r>
+            <a:r>
+              <a:rPr lang="fr" sz="1800"/>
+              <a:t>Technique</a:t>
             </a:r>
             <a:endParaRPr sz="1800"/>
           </a:p>

</xml_diff>